<commit_message>
Name added to presentation
</commit_message>
<xml_diff>
--- a/presentation/Team_Summary.pptx
+++ b/presentation/Team_Summary.pptx
@@ -170,10 +170,9 @@
           <a:lstStyle/>
           <a:p>
             <a:r>
-              <a:rPr lang="en-US" smtClean="0"/>
+              <a:rPr lang="en-US"/>
               <a:t>Click to edit Master title style</a:t>
             </a:r>
-            <a:endParaRPr lang="en-US"/>
           </a:p>
         </p:txBody>
       </p:sp>
@@ -289,10 +288,9 @@
           </a:lstStyle>
           <a:p>
             <a:r>
-              <a:rPr lang="en-US" smtClean="0"/>
+              <a:rPr lang="en-US"/>
               <a:t>Click to edit Master subtitle style</a:t>
             </a:r>
-            <a:endParaRPr lang="en-US"/>
           </a:p>
         </p:txBody>
       </p:sp>
@@ -409,10 +407,9 @@
           <a:lstStyle/>
           <a:p>
             <a:r>
-              <a:rPr lang="en-US" smtClean="0"/>
+              <a:rPr lang="en-US"/>
               <a:t>Click to edit Master title style</a:t>
             </a:r>
-            <a:endParaRPr lang="en-US"/>
           </a:p>
         </p:txBody>
       </p:sp>
@@ -433,38 +430,37 @@
           <a:p>
             <a:pPr lvl="0"/>
             <a:r>
-              <a:rPr lang="en-US" smtClean="0"/>
+              <a:rPr lang="en-US"/>
               <a:t>Click to edit Master text styles</a:t>
             </a:r>
           </a:p>
           <a:p>
             <a:pPr lvl="1"/>
             <a:r>
-              <a:rPr lang="en-US" smtClean="0"/>
+              <a:rPr lang="en-US"/>
               <a:t>Second level</a:t>
             </a:r>
           </a:p>
           <a:p>
             <a:pPr lvl="2"/>
             <a:r>
-              <a:rPr lang="en-US" smtClean="0"/>
+              <a:rPr lang="en-US"/>
               <a:t>Third level</a:t>
             </a:r>
           </a:p>
           <a:p>
             <a:pPr lvl="3"/>
             <a:r>
-              <a:rPr lang="en-US" smtClean="0"/>
+              <a:rPr lang="en-US"/>
               <a:t>Fourth level</a:t>
             </a:r>
           </a:p>
           <a:p>
             <a:pPr lvl="4"/>
             <a:r>
-              <a:rPr lang="en-US" smtClean="0"/>
+              <a:rPr lang="en-US"/>
               <a:t>Fifth level</a:t>
             </a:r>
-            <a:endParaRPr lang="en-US"/>
           </a:p>
         </p:txBody>
       </p:sp>
@@ -586,10 +582,9 @@
           <a:lstStyle/>
           <a:p>
             <a:r>
-              <a:rPr lang="en-US" smtClean="0"/>
+              <a:rPr lang="en-US"/>
               <a:t>Click to edit Master title style</a:t>
             </a:r>
-            <a:endParaRPr lang="en-US"/>
           </a:p>
         </p:txBody>
       </p:sp>
@@ -615,38 +610,37 @@
           <a:p>
             <a:pPr lvl="0"/>
             <a:r>
-              <a:rPr lang="en-US" smtClean="0"/>
+              <a:rPr lang="en-US"/>
               <a:t>Click to edit Master text styles</a:t>
             </a:r>
           </a:p>
           <a:p>
             <a:pPr lvl="1"/>
             <a:r>
-              <a:rPr lang="en-US" smtClean="0"/>
+              <a:rPr lang="en-US"/>
               <a:t>Second level</a:t>
             </a:r>
           </a:p>
           <a:p>
             <a:pPr lvl="2"/>
             <a:r>
-              <a:rPr lang="en-US" smtClean="0"/>
+              <a:rPr lang="en-US"/>
               <a:t>Third level</a:t>
             </a:r>
           </a:p>
           <a:p>
             <a:pPr lvl="3"/>
             <a:r>
-              <a:rPr lang="en-US" smtClean="0"/>
+              <a:rPr lang="en-US"/>
               <a:t>Fourth level</a:t>
             </a:r>
           </a:p>
           <a:p>
             <a:pPr lvl="4"/>
             <a:r>
-              <a:rPr lang="en-US" smtClean="0"/>
+              <a:rPr lang="en-US"/>
               <a:t>Fifth level</a:t>
             </a:r>
-            <a:endParaRPr lang="en-US"/>
           </a:p>
         </p:txBody>
       </p:sp>
@@ -763,10 +757,9 @@
           <a:lstStyle/>
           <a:p>
             <a:r>
-              <a:rPr lang="en-US" smtClean="0"/>
+              <a:rPr lang="en-US"/>
               <a:t>Click to edit Master title style</a:t>
             </a:r>
-            <a:endParaRPr lang="en-US"/>
           </a:p>
         </p:txBody>
       </p:sp>
@@ -787,38 +780,37 @@
           <a:p>
             <a:pPr lvl="0"/>
             <a:r>
-              <a:rPr lang="en-US" smtClean="0"/>
+              <a:rPr lang="en-US"/>
               <a:t>Click to edit Master text styles</a:t>
             </a:r>
           </a:p>
           <a:p>
             <a:pPr lvl="1"/>
             <a:r>
-              <a:rPr lang="en-US" smtClean="0"/>
+              <a:rPr lang="en-US"/>
               <a:t>Second level</a:t>
             </a:r>
           </a:p>
           <a:p>
             <a:pPr lvl="2"/>
             <a:r>
-              <a:rPr lang="en-US" smtClean="0"/>
+              <a:rPr lang="en-US"/>
               <a:t>Third level</a:t>
             </a:r>
           </a:p>
           <a:p>
             <a:pPr lvl="3"/>
             <a:r>
-              <a:rPr lang="en-US" smtClean="0"/>
+              <a:rPr lang="en-US"/>
               <a:t>Fourth level</a:t>
             </a:r>
           </a:p>
           <a:p>
             <a:pPr lvl="4"/>
             <a:r>
-              <a:rPr lang="en-US" smtClean="0"/>
+              <a:rPr lang="en-US"/>
               <a:t>Fifth level</a:t>
             </a:r>
-            <a:endParaRPr lang="en-US"/>
           </a:p>
         </p:txBody>
       </p:sp>
@@ -944,10 +936,9 @@
           </a:lstStyle>
           <a:p>
             <a:r>
-              <a:rPr lang="en-US" smtClean="0"/>
+              <a:rPr lang="en-US"/>
               <a:t>Click to edit Master title style</a:t>
             </a:r>
-            <a:endParaRPr lang="en-US"/>
           </a:p>
         </p:txBody>
       </p:sp>
@@ -1064,7 +1055,7 @@
           <a:p>
             <a:pPr lvl="0"/>
             <a:r>
-              <a:rPr lang="en-US" smtClean="0"/>
+              <a:rPr lang="en-US"/>
               <a:t>Click to edit Master text styles</a:t>
             </a:r>
           </a:p>
@@ -1183,10 +1174,9 @@
           <a:lstStyle/>
           <a:p>
             <a:r>
-              <a:rPr lang="en-US" smtClean="0"/>
+              <a:rPr lang="en-US"/>
               <a:t>Click to edit Master title style</a:t>
             </a:r>
-            <a:endParaRPr lang="en-US"/>
           </a:p>
         </p:txBody>
       </p:sp>
@@ -1240,38 +1230,37 @@
           <a:p>
             <a:pPr lvl="0"/>
             <a:r>
-              <a:rPr lang="en-US" smtClean="0"/>
+              <a:rPr lang="en-US"/>
               <a:t>Click to edit Master text styles</a:t>
             </a:r>
           </a:p>
           <a:p>
             <a:pPr lvl="1"/>
             <a:r>
-              <a:rPr lang="en-US" smtClean="0"/>
+              <a:rPr lang="en-US"/>
               <a:t>Second level</a:t>
             </a:r>
           </a:p>
           <a:p>
             <a:pPr lvl="2"/>
             <a:r>
-              <a:rPr lang="en-US" smtClean="0"/>
+              <a:rPr lang="en-US"/>
               <a:t>Third level</a:t>
             </a:r>
           </a:p>
           <a:p>
             <a:pPr lvl="3"/>
             <a:r>
-              <a:rPr lang="en-US" smtClean="0"/>
+              <a:rPr lang="en-US"/>
               <a:t>Fourth level</a:t>
             </a:r>
           </a:p>
           <a:p>
             <a:pPr lvl="4"/>
             <a:r>
-              <a:rPr lang="en-US" smtClean="0"/>
+              <a:rPr lang="en-US"/>
               <a:t>Fifth level</a:t>
             </a:r>
-            <a:endParaRPr lang="en-US"/>
           </a:p>
         </p:txBody>
       </p:sp>
@@ -1325,38 +1314,37 @@
           <a:p>
             <a:pPr lvl="0"/>
             <a:r>
-              <a:rPr lang="en-US" smtClean="0"/>
+              <a:rPr lang="en-US"/>
               <a:t>Click to edit Master text styles</a:t>
             </a:r>
           </a:p>
           <a:p>
             <a:pPr lvl="1"/>
             <a:r>
-              <a:rPr lang="en-US" smtClean="0"/>
+              <a:rPr lang="en-US"/>
               <a:t>Second level</a:t>
             </a:r>
           </a:p>
           <a:p>
             <a:pPr lvl="2"/>
             <a:r>
-              <a:rPr lang="en-US" smtClean="0"/>
+              <a:rPr lang="en-US"/>
               <a:t>Third level</a:t>
             </a:r>
           </a:p>
           <a:p>
             <a:pPr lvl="3"/>
             <a:r>
-              <a:rPr lang="en-US" smtClean="0"/>
+              <a:rPr lang="en-US"/>
               <a:t>Fourth level</a:t>
             </a:r>
           </a:p>
           <a:p>
             <a:pPr lvl="4"/>
             <a:r>
-              <a:rPr lang="en-US" smtClean="0"/>
+              <a:rPr lang="en-US"/>
               <a:t>Fifth level</a:t>
             </a:r>
-            <a:endParaRPr lang="en-US"/>
           </a:p>
         </p:txBody>
       </p:sp>
@@ -1477,10 +1465,9 @@
           </a:lstStyle>
           <a:p>
             <a:r>
-              <a:rPr lang="en-US" smtClean="0"/>
+              <a:rPr lang="en-US"/>
               <a:t>Click to edit Master title style</a:t>
             </a:r>
-            <a:endParaRPr lang="en-US"/>
           </a:p>
         </p:txBody>
       </p:sp>
@@ -1543,7 +1530,7 @@
           <a:p>
             <a:pPr lvl="0"/>
             <a:r>
-              <a:rPr lang="en-US" smtClean="0"/>
+              <a:rPr lang="en-US"/>
               <a:t>Click to edit Master text styles</a:t>
             </a:r>
           </a:p>
@@ -1599,38 +1586,37 @@
           <a:p>
             <a:pPr lvl="0"/>
             <a:r>
-              <a:rPr lang="en-US" smtClean="0"/>
+              <a:rPr lang="en-US"/>
               <a:t>Click to edit Master text styles</a:t>
             </a:r>
           </a:p>
           <a:p>
             <a:pPr lvl="1"/>
             <a:r>
-              <a:rPr lang="en-US" smtClean="0"/>
+              <a:rPr lang="en-US"/>
               <a:t>Second level</a:t>
             </a:r>
           </a:p>
           <a:p>
             <a:pPr lvl="2"/>
             <a:r>
-              <a:rPr lang="en-US" smtClean="0"/>
+              <a:rPr lang="en-US"/>
               <a:t>Third level</a:t>
             </a:r>
           </a:p>
           <a:p>
             <a:pPr lvl="3"/>
             <a:r>
-              <a:rPr lang="en-US" smtClean="0"/>
+              <a:rPr lang="en-US"/>
               <a:t>Fourth level</a:t>
             </a:r>
           </a:p>
           <a:p>
             <a:pPr lvl="4"/>
             <a:r>
-              <a:rPr lang="en-US" smtClean="0"/>
+              <a:rPr lang="en-US"/>
               <a:t>Fifth level</a:t>
             </a:r>
-            <a:endParaRPr lang="en-US"/>
           </a:p>
         </p:txBody>
       </p:sp>
@@ -1693,7 +1679,7 @@
           <a:p>
             <a:pPr lvl="0"/>
             <a:r>
-              <a:rPr lang="en-US" smtClean="0"/>
+              <a:rPr lang="en-US"/>
               <a:t>Click to edit Master text styles</a:t>
             </a:r>
           </a:p>
@@ -1749,38 +1735,37 @@
           <a:p>
             <a:pPr lvl="0"/>
             <a:r>
-              <a:rPr lang="en-US" smtClean="0"/>
+              <a:rPr lang="en-US"/>
               <a:t>Click to edit Master text styles</a:t>
             </a:r>
           </a:p>
           <a:p>
             <a:pPr lvl="1"/>
             <a:r>
-              <a:rPr lang="en-US" smtClean="0"/>
+              <a:rPr lang="en-US"/>
               <a:t>Second level</a:t>
             </a:r>
           </a:p>
           <a:p>
             <a:pPr lvl="2"/>
             <a:r>
-              <a:rPr lang="en-US" smtClean="0"/>
+              <a:rPr lang="en-US"/>
               <a:t>Third level</a:t>
             </a:r>
           </a:p>
           <a:p>
             <a:pPr lvl="3"/>
             <a:r>
-              <a:rPr lang="en-US" smtClean="0"/>
+              <a:rPr lang="en-US"/>
               <a:t>Fourth level</a:t>
             </a:r>
           </a:p>
           <a:p>
             <a:pPr lvl="4"/>
             <a:r>
-              <a:rPr lang="en-US" smtClean="0"/>
+              <a:rPr lang="en-US"/>
               <a:t>Fifth level</a:t>
             </a:r>
-            <a:endParaRPr lang="en-US"/>
           </a:p>
         </p:txBody>
       </p:sp>
@@ -1897,10 +1882,9 @@
           <a:lstStyle/>
           <a:p>
             <a:r>
-              <a:rPr lang="en-US" smtClean="0"/>
+              <a:rPr lang="en-US"/>
               <a:t>Click to edit Master title style</a:t>
             </a:r>
-            <a:endParaRPr lang="en-US"/>
           </a:p>
         </p:txBody>
       </p:sp>
@@ -2123,10 +2107,9 @@
           </a:lstStyle>
           <a:p>
             <a:r>
-              <a:rPr lang="en-US" smtClean="0"/>
+              <a:rPr lang="en-US"/>
               <a:t>Click to edit Master title style</a:t>
             </a:r>
-            <a:endParaRPr lang="en-US"/>
           </a:p>
         </p:txBody>
       </p:sp>
@@ -2180,38 +2163,37 @@
           <a:p>
             <a:pPr lvl="0"/>
             <a:r>
-              <a:rPr lang="en-US" smtClean="0"/>
+              <a:rPr lang="en-US"/>
               <a:t>Click to edit Master text styles</a:t>
             </a:r>
           </a:p>
           <a:p>
             <a:pPr lvl="1"/>
             <a:r>
-              <a:rPr lang="en-US" smtClean="0"/>
+              <a:rPr lang="en-US"/>
               <a:t>Second level</a:t>
             </a:r>
           </a:p>
           <a:p>
             <a:pPr lvl="2"/>
             <a:r>
-              <a:rPr lang="en-US" smtClean="0"/>
+              <a:rPr lang="en-US"/>
               <a:t>Third level</a:t>
             </a:r>
           </a:p>
           <a:p>
             <a:pPr lvl="3"/>
             <a:r>
-              <a:rPr lang="en-US" smtClean="0"/>
+              <a:rPr lang="en-US"/>
               <a:t>Fourth level</a:t>
             </a:r>
           </a:p>
           <a:p>
             <a:pPr lvl="4"/>
             <a:r>
-              <a:rPr lang="en-US" smtClean="0"/>
+              <a:rPr lang="en-US"/>
               <a:t>Fifth level</a:t>
             </a:r>
-            <a:endParaRPr lang="en-US"/>
           </a:p>
         </p:txBody>
       </p:sp>
@@ -2274,7 +2256,7 @@
           <a:p>
             <a:pPr lvl="0"/>
             <a:r>
-              <a:rPr lang="en-US" smtClean="0"/>
+              <a:rPr lang="en-US"/>
               <a:t>Click to edit Master text styles</a:t>
             </a:r>
           </a:p>
@@ -2402,10 +2384,9 @@
           </a:lstStyle>
           <a:p>
             <a:r>
-              <a:rPr lang="en-US" smtClean="0"/>
+              <a:rPr lang="en-US"/>
               <a:t>Click to edit Master title style</a:t>
             </a:r>
-            <a:endParaRPr lang="en-US"/>
           </a:p>
         </p:txBody>
       </p:sp>
@@ -2529,7 +2510,7 @@
           <a:p>
             <a:pPr lvl="0"/>
             <a:r>
-              <a:rPr lang="en-US" smtClean="0"/>
+              <a:rPr lang="en-US"/>
               <a:t>Click to edit Master text styles</a:t>
             </a:r>
           </a:p>
@@ -2663,10 +2644,9 @@
           <a:lstStyle/>
           <a:p>
             <a:r>
-              <a:rPr lang="en-US" smtClean="0"/>
+              <a:rPr lang="en-US"/>
               <a:t>Click to edit Master title style</a:t>
             </a:r>
-            <a:endParaRPr lang="en-US"/>
           </a:p>
         </p:txBody>
       </p:sp>
@@ -2697,38 +2677,37 @@
           <a:p>
             <a:pPr lvl="0"/>
             <a:r>
-              <a:rPr lang="en-US" smtClean="0"/>
+              <a:rPr lang="en-US"/>
               <a:t>Click to edit Master text styles</a:t>
             </a:r>
           </a:p>
           <a:p>
             <a:pPr lvl="1"/>
             <a:r>
-              <a:rPr lang="en-US" smtClean="0"/>
+              <a:rPr lang="en-US"/>
               <a:t>Second level</a:t>
             </a:r>
           </a:p>
           <a:p>
             <a:pPr lvl="2"/>
             <a:r>
-              <a:rPr lang="en-US" smtClean="0"/>
+              <a:rPr lang="en-US"/>
               <a:t>Third level</a:t>
             </a:r>
           </a:p>
           <a:p>
             <a:pPr lvl="3"/>
             <a:r>
-              <a:rPr lang="en-US" smtClean="0"/>
+              <a:rPr lang="en-US"/>
               <a:t>Fourth level</a:t>
             </a:r>
           </a:p>
           <a:p>
             <a:pPr lvl="4"/>
             <a:r>
-              <a:rPr lang="en-US" smtClean="0"/>
+              <a:rPr lang="en-US"/>
               <a:t>Fifth level</a:t>
             </a:r>
-            <a:endParaRPr lang="en-US"/>
           </a:p>
         </p:txBody>
       </p:sp>
@@ -3185,85 +3164,68 @@
           <a:p>
             <a:pPr algn="l"/>
             <a:r>
-              <a:rPr lang="en-US" sz="1800" b="1" dirty="0" smtClean="0"/>
-              <a:t>Sirius </a:t>
-            </a:r>
-            <a:r>
               <a:rPr lang="en-US" sz="1800" b="1" dirty="0"/>
-              <a:t>Cybernetics Corporation</a:t>
-            </a:r>
-            <a:r>
-              <a:rPr lang="en-US" sz="1600" b="1" dirty="0"/>
-              <a:t/>
+              <a:t>Sirius Cybernetics Corporation</a:t>
             </a:r>
             <a:br>
               <a:rPr lang="en-US" sz="1600" b="1" dirty="0"/>
             </a:br>
             <a:r>
-              <a:rPr lang="en-US" sz="1600" dirty="0" smtClean="0"/>
+              <a:rPr lang="en-US" sz="1600" dirty="0"/>
               <a:t> - </a:t>
             </a:r>
             <a:r>
-              <a:rPr lang="en-US" sz="1600" dirty="0" err="1" smtClean="0"/>
+              <a:rPr lang="en-US" sz="1600" dirty="0" err="1"/>
               <a:t>Kanishka</a:t>
             </a:r>
             <a:r>
-              <a:rPr lang="en-US" sz="1600" dirty="0" smtClean="0"/>
+              <a:rPr lang="en-US" sz="1600" dirty="0"/>
               <a:t> </a:t>
             </a:r>
             <a:r>
-              <a:rPr lang="en-US" sz="1600" dirty="0" err="1" smtClean="0"/>
+              <a:rPr lang="en-US" sz="1600" dirty="0" err="1"/>
               <a:t>Misra</a:t>
             </a:r>
             <a:r>
-              <a:rPr lang="en-US" sz="1600" dirty="0" smtClean="0"/>
+              <a:rPr lang="en-US" sz="1600" dirty="0"/>
               <a:t>, Data Analyst/Team Lead, R specialist</a:t>
             </a:r>
             <a:br>
-              <a:rPr lang="en-US" sz="1600" dirty="0" smtClean="0"/>
+              <a:rPr lang="en-US" sz="1600" dirty="0"/>
             </a:br>
             <a:r>
-              <a:rPr lang="en-US" sz="1600" dirty="0" smtClean="0"/>
+              <a:rPr lang="en-US" sz="1600" dirty="0"/>
               <a:t> - Ben Brubaker, Front End Dev., AngularJS specialist</a:t>
             </a:r>
             <a:br>
-              <a:rPr lang="en-US" sz="1600" dirty="0" smtClean="0"/>
+              <a:rPr lang="en-US" sz="1600" dirty="0"/>
             </a:br>
             <a:r>
-              <a:rPr lang="en-US" sz="1600" dirty="0" smtClean="0"/>
+              <a:rPr lang="en-US" sz="1600" dirty="0"/>
               <a:t> - Michael Crowell, Middle-tier Dev., Scripting specialist</a:t>
             </a:r>
-            <a:r>
-              <a:rPr lang="en-US" sz="1600" dirty="0" smtClean="0"/>
-              <a:t/>
-            </a:r>
             <a:br>
-              <a:rPr lang="en-US" sz="1600" dirty="0" smtClean="0"/>
+              <a:rPr lang="en-US" sz="1600" dirty="0"/>
             </a:br>
             <a:r>
-              <a:rPr lang="en-US" sz="1600" dirty="0" smtClean="0"/>
+              <a:rPr lang="en-US" sz="1600" dirty="0"/>
               <a:t> - Jim </a:t>
             </a:r>
             <a:r>
-              <a:rPr lang="en-US" sz="1600" dirty="0" err="1" smtClean="0"/>
+              <a:rPr lang="en-US" sz="1600" dirty="0" err="1"/>
               <a:t>Ulbright</a:t>
             </a:r>
             <a:r>
-              <a:rPr lang="en-US" sz="1600" dirty="0" smtClean="0"/>
+              <a:rPr lang="en-US" sz="1600" dirty="0"/>
               <a:t>, Data Analyst, Tableau specialist</a:t>
             </a:r>
-            <a:r>
-              <a:rPr lang="en-US" sz="1600" dirty="0" smtClean="0"/>
-              <a:t/>
-            </a:r>
             <a:br>
-              <a:rPr lang="en-US" sz="1600" dirty="0" smtClean="0"/>
+              <a:rPr lang="en-US" sz="1600" dirty="0"/>
             </a:br>
             <a:r>
-              <a:rPr lang="en-US" sz="1600" dirty="0" smtClean="0"/>
+              <a:rPr lang="en-US" sz="1600" dirty="0"/>
               <a:t> - Triston Yoder, Front End Dev., Dev Ops</a:t>
             </a:r>
-            <a:endParaRPr lang="en-US" sz="1600" dirty="0"/>
           </a:p>
         </p:txBody>
       </p:sp>
@@ -3308,7 +3270,7 @@
               <a:buChar char="•"/>
             </a:pPr>
             <a:r>
-              <a:rPr lang="en-US" sz="1800" dirty="0" smtClean="0">
+              <a:rPr lang="en-US" sz="1800" dirty="0">
                 <a:solidFill>
                   <a:schemeClr val="tx1"/>
                 </a:solidFill>
@@ -3322,7 +3284,7 @@
               <a:buChar char="•"/>
             </a:pPr>
             <a:r>
-              <a:rPr lang="en-US" sz="1400" dirty="0" smtClean="0">
+              <a:rPr lang="en-US" sz="1400" dirty="0">
                 <a:solidFill>
                   <a:schemeClr val="tx1"/>
                 </a:solidFill>
@@ -3336,7 +3298,7 @@
               <a:buChar char="•"/>
             </a:pPr>
             <a:r>
-              <a:rPr lang="en-US" sz="1400" dirty="0" smtClean="0">
+              <a:rPr lang="en-US" sz="1400" dirty="0">
                 <a:solidFill>
                   <a:schemeClr val="tx1"/>
                 </a:solidFill>
@@ -3350,7 +3312,7 @@
               <a:buChar char="•"/>
             </a:pPr>
             <a:r>
-              <a:rPr lang="en-US" sz="1800" dirty="0" smtClean="0">
+              <a:rPr lang="en-US" sz="1800" dirty="0">
                 <a:solidFill>
                   <a:schemeClr val="tx1"/>
                 </a:solidFill>
@@ -3364,7 +3326,7 @@
               <a:buChar char="•"/>
             </a:pPr>
             <a:r>
-              <a:rPr lang="en-US" sz="1400" dirty="0" smtClean="0">
+              <a:rPr lang="en-US" sz="1400" dirty="0">
                 <a:solidFill>
                   <a:schemeClr val="tx1"/>
                 </a:solidFill>
@@ -3378,7 +3340,7 @@
               <a:buChar char="•"/>
             </a:pPr>
             <a:r>
-              <a:rPr lang="en-US" sz="1400" dirty="0" smtClean="0">
+              <a:rPr lang="en-US" sz="1400" dirty="0">
                 <a:solidFill>
                   <a:schemeClr val="tx1"/>
                 </a:solidFill>
@@ -3392,13 +3354,125 @@
               <a:buChar char="•"/>
             </a:pPr>
             <a:r>
-              <a:rPr lang="en-US" sz="1800" dirty="0" smtClean="0">
+              <a:rPr lang="en-US" sz="1800" dirty="0">
                 <a:solidFill>
                   <a:schemeClr val="tx1"/>
                 </a:solidFill>
               </a:rPr>
               <a:t>Addressing the Problem</a:t>
             </a:r>
+          </a:p>
+          <a:p>
+            <a:pPr marL="742950" lvl="1" indent="-285750" algn="l">
+              <a:buFont typeface="Arial" panose="020B0604020202020204" pitchFamily="34" charset="0"/>
+              <a:buChar char="•"/>
+            </a:pPr>
+            <a:r>
+              <a:rPr lang="en-US" sz="1400" dirty="0">
+                <a:solidFill>
+                  <a:schemeClr val="tx1"/>
+                </a:solidFill>
+              </a:rPr>
+              <a:t>Links two distinct datasets into cohesive visualizations</a:t>
+            </a:r>
+          </a:p>
+          <a:p>
+            <a:pPr marL="742950" lvl="1" indent="-285750" algn="l">
+              <a:buFont typeface="Arial" panose="020B0604020202020204" pitchFamily="34" charset="0"/>
+              <a:buChar char="•"/>
+            </a:pPr>
+            <a:r>
+              <a:rPr lang="en-US" sz="1400" dirty="0">
+                <a:solidFill>
+                  <a:schemeClr val="tx1"/>
+                </a:solidFill>
+              </a:rPr>
+              <a:t>Few tools for lower level governmental organizations</a:t>
+            </a:r>
+          </a:p>
+          <a:p>
+            <a:pPr marL="285750" indent="-285750" algn="l">
+              <a:buFont typeface="Arial" panose="020B0604020202020204" pitchFamily="34" charset="0"/>
+              <a:buChar char="•"/>
+            </a:pPr>
+            <a:r>
+              <a:rPr lang="en-US" sz="1800" dirty="0">
+                <a:solidFill>
+                  <a:schemeClr val="tx1"/>
+                </a:solidFill>
+              </a:rPr>
+              <a:t>Solution Viability</a:t>
+            </a:r>
+          </a:p>
+          <a:p>
+            <a:pPr marL="742950" lvl="1" indent="-285750" algn="l">
+              <a:buFont typeface="Arial" panose="020B0604020202020204" pitchFamily="34" charset="0"/>
+              <a:buChar char="•"/>
+            </a:pPr>
+            <a:r>
+              <a:rPr lang="en-US" sz="1400" dirty="0">
+                <a:solidFill>
+                  <a:schemeClr val="tx1"/>
+                </a:solidFill>
+              </a:rPr>
+              <a:t>Doesn’t remove ability for user to explore data themselves</a:t>
+            </a:r>
+          </a:p>
+          <a:p>
+            <a:pPr marL="742950" lvl="1" indent="-285750" algn="l">
+              <a:buFont typeface="Arial" panose="020B0604020202020204" pitchFamily="34" charset="0"/>
+              <a:buChar char="•"/>
+            </a:pPr>
+            <a:r>
+              <a:rPr lang="en-US" sz="1400" dirty="0">
+                <a:solidFill>
+                  <a:schemeClr val="tx1"/>
+                </a:solidFill>
+              </a:rPr>
+              <a:t>Easy to use interface makes experience intuitive for user</a:t>
+            </a:r>
+          </a:p>
+          <a:p>
+            <a:pPr marL="285750" indent="-285750" algn="l">
+              <a:buFont typeface="Arial" panose="020B0604020202020204" pitchFamily="34" charset="0"/>
+              <a:buChar char="•"/>
+            </a:pPr>
+            <a:r>
+              <a:rPr lang="en-US" sz="1800" dirty="0">
+                <a:solidFill>
+                  <a:schemeClr val="tx1"/>
+                </a:solidFill>
+              </a:rPr>
+              <a:t>Future Work</a:t>
+            </a:r>
+          </a:p>
+          <a:p>
+            <a:pPr marL="742950" lvl="1" indent="-285750" algn="l">
+              <a:buFont typeface="Arial" panose="020B0604020202020204" pitchFamily="34" charset="0"/>
+              <a:buChar char="•"/>
+            </a:pPr>
+            <a:r>
+              <a:rPr lang="en-US" sz="1400" dirty="0">
+                <a:solidFill>
+                  <a:schemeClr val="tx1"/>
+                </a:solidFill>
+              </a:rPr>
+              <a:t>Expand scope of metrics covered to allow for more user freedom</a:t>
+            </a:r>
+          </a:p>
+          <a:p>
+            <a:pPr marL="742950" lvl="1" indent="-285750" algn="l">
+              <a:buFont typeface="Arial" panose="020B0604020202020204" pitchFamily="34" charset="0"/>
+              <a:buChar char="•"/>
+            </a:pPr>
+            <a:r>
+              <a:rPr lang="en-US" sz="1400" dirty="0">
+                <a:solidFill>
+                  <a:schemeClr val="tx1"/>
+                </a:solidFill>
+              </a:rPr>
+              <a:t>Consider different visualizations (perhaps a map) to provide more links between distinct metrics</a:t>
+            </a:r>
             <a:endParaRPr lang="en-US" sz="1800" dirty="0">
               <a:solidFill>
                 <a:schemeClr val="tx1"/>
@@ -3406,144 +3480,7 @@
             </a:endParaRPr>
           </a:p>
           <a:p>
-            <a:pPr marL="742950" lvl="1" indent="-285750" algn="l">
-              <a:buFont typeface="Arial" panose="020B0604020202020204" pitchFamily="34" charset="0"/>
-              <a:buChar char="•"/>
-            </a:pPr>
-            <a:r>
-              <a:rPr lang="en-US" sz="1400" dirty="0" smtClean="0">
-                <a:solidFill>
-                  <a:schemeClr val="tx1"/>
-                </a:solidFill>
-              </a:rPr>
-              <a:t>Links two distinct datasets into cohesive visualizations</a:t>
-            </a:r>
-          </a:p>
-          <a:p>
-            <a:pPr marL="742950" lvl="1" indent="-285750" algn="l">
-              <a:buFont typeface="Arial" panose="020B0604020202020204" pitchFamily="34" charset="0"/>
-              <a:buChar char="•"/>
-            </a:pPr>
-            <a:r>
-              <a:rPr lang="en-US" sz="1400" dirty="0" smtClean="0">
-                <a:solidFill>
-                  <a:schemeClr val="tx1"/>
-                </a:solidFill>
-              </a:rPr>
-              <a:t>Few tools for lower level governmental organizations</a:t>
-            </a:r>
-          </a:p>
-          <a:p>
-            <a:pPr marL="285750" indent="-285750" algn="l">
-              <a:buFont typeface="Arial" panose="020B0604020202020204" pitchFamily="34" charset="0"/>
-              <a:buChar char="•"/>
-            </a:pPr>
-            <a:r>
-              <a:rPr lang="en-US" sz="1800" dirty="0" smtClean="0">
-                <a:solidFill>
-                  <a:schemeClr val="tx1"/>
-                </a:solidFill>
-              </a:rPr>
-              <a:t>Solution Viability</a:t>
-            </a:r>
             <a:endParaRPr lang="en-US" sz="1800" dirty="0">
-              <a:solidFill>
-                <a:schemeClr val="tx1"/>
-              </a:solidFill>
-            </a:endParaRPr>
-          </a:p>
-          <a:p>
-            <a:pPr marL="742950" lvl="1" indent="-285750" algn="l">
-              <a:buFont typeface="Arial" panose="020B0604020202020204" pitchFamily="34" charset="0"/>
-              <a:buChar char="•"/>
-            </a:pPr>
-            <a:r>
-              <a:rPr lang="en-US" sz="1400" dirty="0" smtClean="0">
-                <a:solidFill>
-                  <a:schemeClr val="tx1"/>
-                </a:solidFill>
-              </a:rPr>
-              <a:t>Doesn’t remove ability for user to explore data themselves</a:t>
-            </a:r>
-            <a:endParaRPr lang="en-US" sz="1400" dirty="0">
-              <a:solidFill>
-                <a:schemeClr val="tx1"/>
-              </a:solidFill>
-            </a:endParaRPr>
-          </a:p>
-          <a:p>
-            <a:pPr marL="742950" lvl="1" indent="-285750" algn="l">
-              <a:buFont typeface="Arial" panose="020B0604020202020204" pitchFamily="34" charset="0"/>
-              <a:buChar char="•"/>
-            </a:pPr>
-            <a:r>
-              <a:rPr lang="en-US" sz="1400" dirty="0" smtClean="0">
-                <a:solidFill>
-                  <a:schemeClr val="tx1"/>
-                </a:solidFill>
-              </a:rPr>
-              <a:t>Easy to use interface makes experience intuitive for user</a:t>
-            </a:r>
-          </a:p>
-          <a:p>
-            <a:pPr marL="285750" indent="-285750" algn="l">
-              <a:buFont typeface="Arial" panose="020B0604020202020204" pitchFamily="34" charset="0"/>
-              <a:buChar char="•"/>
-            </a:pPr>
-            <a:r>
-              <a:rPr lang="en-US" sz="1800" dirty="0" smtClean="0">
-                <a:solidFill>
-                  <a:schemeClr val="tx1"/>
-                </a:solidFill>
-              </a:rPr>
-              <a:t>Future Work</a:t>
-            </a:r>
-            <a:endParaRPr lang="en-US" sz="1800" dirty="0">
-              <a:solidFill>
-                <a:schemeClr val="tx1"/>
-              </a:solidFill>
-            </a:endParaRPr>
-          </a:p>
-          <a:p>
-            <a:pPr marL="742950" lvl="1" indent="-285750" algn="l">
-              <a:buFont typeface="Arial" panose="020B0604020202020204" pitchFamily="34" charset="0"/>
-              <a:buChar char="•"/>
-            </a:pPr>
-            <a:r>
-              <a:rPr lang="en-US" sz="1400" dirty="0" smtClean="0">
-                <a:solidFill>
-                  <a:schemeClr val="tx1"/>
-                </a:solidFill>
-              </a:rPr>
-              <a:t>Expand scope of metrics covered to allow for more user freedom</a:t>
-            </a:r>
-            <a:endParaRPr lang="en-US" sz="1400" dirty="0">
-              <a:solidFill>
-                <a:schemeClr val="tx1"/>
-              </a:solidFill>
-            </a:endParaRPr>
-          </a:p>
-          <a:p>
-            <a:pPr marL="742950" lvl="1" indent="-285750" algn="l">
-              <a:buFont typeface="Arial" panose="020B0604020202020204" pitchFamily="34" charset="0"/>
-              <a:buChar char="•"/>
-            </a:pPr>
-            <a:r>
-              <a:rPr lang="en-US" sz="1400" dirty="0" smtClean="0">
-                <a:solidFill>
-                  <a:schemeClr val="tx1"/>
-                </a:solidFill>
-              </a:rPr>
-              <a:t>Consider different visualizations (perhaps a map) to provide more links between distinct metrics</a:t>
-            </a:r>
-            <a:endParaRPr lang="en-US" sz="1800" dirty="0">
-              <a:solidFill>
-                <a:schemeClr val="tx1"/>
-              </a:solidFill>
-            </a:endParaRPr>
-          </a:p>
-          <a:p>
-            <a:endParaRPr lang="en-US" sz="1800" dirty="0" smtClean="0">
               <a:solidFill>
                 <a:schemeClr val="tx1"/>
               </a:solidFill>
@@ -3588,19 +3525,19 @@
           </a:bodyPr>
           <a:lstStyle/>
           <a:p>
-            <a:endParaRPr lang="en-US" sz="400" b="1" dirty="0" smtClean="0">
+            <a:endParaRPr lang="en-US" sz="400" b="1" dirty="0">
               <a:latin typeface="+mj-lt"/>
             </a:endParaRPr>
           </a:p>
           <a:p>
             <a:r>
-              <a:rPr lang="en-US" b="1" u="sng" dirty="0" smtClean="0">
+              <a:rPr lang="en-US" b="1" u="sng" dirty="0">
                 <a:latin typeface="+mj-lt"/>
               </a:rPr>
               <a:t>Challenge</a:t>
             </a:r>
             <a:r>
-              <a:rPr lang="en-US" b="1" dirty="0" smtClean="0">
+              <a:rPr lang="en-US" b="1" dirty="0">
                 <a:latin typeface="+mj-lt"/>
               </a:rPr>
               <a:t>: Innovators Challenge</a:t>
@@ -3608,12 +3545,12 @@
           </a:p>
           <a:p>
             <a:r>
-              <a:rPr lang="en-US" b="1" i="1" dirty="0" smtClean="0">
+              <a:rPr lang="en-US" b="1" i="1" dirty="0" err="1">
                 <a:latin typeface="+mj-lt"/>
               </a:rPr>
-              <a:t>Sol Name</a:t>
-            </a:r>
-            <a:endParaRPr lang="en-US" b="1" dirty="0" smtClean="0">
+              <a:t>IndiVision</a:t>
+            </a:r>
+            <a:endParaRPr lang="en-US" b="1" dirty="0">
               <a:latin typeface="+mj-lt"/>
             </a:endParaRPr>
           </a:p>
@@ -3622,7 +3559,7 @@
               <a:rPr lang="en-US" sz="1600" dirty="0"/>
               <a:t>The efficacy of government is reflected in the welfare of constituents, so we produced tools that will allow county governments to correlate spending to various wellness metrics.</a:t>
             </a:r>
-            <a:endParaRPr lang="en-US" sz="1600" dirty="0" smtClean="0">
+            <a:endParaRPr lang="en-US" sz="1600" dirty="0">
               <a:latin typeface="+mj-lt"/>
             </a:endParaRPr>
           </a:p>
@@ -3666,132 +3603,94 @@
           <a:lstStyle/>
           <a:p>
             <a:r>
-              <a:rPr lang="en-US" sz="1600" u="sng" dirty="0" smtClean="0"/>
+              <a:rPr lang="en-US" sz="1600" u="sng" dirty="0"/>
               <a:t>Technology Used</a:t>
             </a:r>
             <a:r>
-              <a:rPr lang="en-US" sz="1600" dirty="0" smtClean="0"/>
+              <a:rPr lang="en-US" sz="1600" dirty="0"/>
               <a:t>: Angular1, </a:t>
             </a:r>
             <a:r>
-              <a:rPr lang="en-US" sz="1600" dirty="0" err="1" smtClean="0"/>
+              <a:rPr lang="en-US" sz="1600" dirty="0" err="1"/>
               <a:t>ParticlesJS</a:t>
             </a:r>
             <a:r>
-              <a:rPr lang="en-US" sz="1600" dirty="0" smtClean="0"/>
+              <a:rPr lang="en-US" sz="1600" dirty="0"/>
               <a:t>, Tableau, R</a:t>
             </a:r>
-            <a:endParaRPr lang="en-US" sz="1600" dirty="0" smtClean="0"/>
-          </a:p>
-          <a:p>
-            <a:r>
-              <a:rPr lang="en-US" sz="1600" u="sng" dirty="0" smtClean="0"/>
+          </a:p>
+          <a:p>
+            <a:r>
+              <a:rPr lang="en-US" sz="1600" u="sng" dirty="0"/>
               <a:t>Disclose Original Work vs Pre-Built</a:t>
-            </a:r>
-            <a:r>
-              <a:rPr lang="en-US" sz="1600" dirty="0" smtClean="0"/>
-              <a:t>: </a:t>
-            </a:r>
-            <a:r>
-              <a:rPr lang="en-US" sz="1600" dirty="0" err="1" smtClean="0"/>
-              <a:t>ParticleJS</a:t>
-            </a:r>
-            <a:r>
-              <a:rPr lang="en-US" sz="1600" dirty="0" smtClean="0"/>
-              <a:t>, </a:t>
-            </a:r>
-            <a:r>
-              <a:rPr lang="en-US" sz="1600" dirty="0" err="1" smtClean="0"/>
-              <a:t>TidyVerse</a:t>
-            </a:r>
-            <a:r>
-              <a:rPr lang="en-US" sz="1600" dirty="0" smtClean="0"/>
-              <a:t>, Pandas</a:t>
-            </a:r>
-            <a:endParaRPr lang="en-US" sz="1600" dirty="0" smtClean="0"/>
-          </a:p>
-          <a:p>
-            <a:r>
-              <a:rPr lang="en-US" sz="1600" u="sng" dirty="0" smtClean="0"/>
-              <a:t>List of data sets or APIs used or created by the solution</a:t>
             </a:r>
             <a:r>
               <a:rPr lang="en-US" sz="1600" dirty="0"/>
               <a:t>: </a:t>
             </a:r>
-            <a:endParaRPr lang="en-US" sz="1600" dirty="0" smtClean="0"/>
-          </a:p>
-          <a:p>
-            <a:r>
-              <a:rPr lang="en-US" sz="1600" dirty="0" smtClean="0">
-                <a:hlinkClick r:id="rId2"/>
-              </a:rPr>
-              <a:t>http</a:t>
-            </a:r>
+            <a:r>
+              <a:rPr lang="en-US" sz="1600" dirty="0" err="1"/>
+              <a:t>ParticleJS</a:t>
+            </a:r>
+            <a:r>
+              <a:rPr lang="en-US" sz="1600" dirty="0"/>
+              <a:t>, </a:t>
+            </a:r>
+            <a:r>
+              <a:rPr lang="en-US" sz="1600" dirty="0" err="1"/>
+              <a:t>TidyVerse</a:t>
+            </a:r>
+            <a:r>
+              <a:rPr lang="en-US" sz="1600" dirty="0"/>
+              <a:t>, Pandas</a:t>
+            </a:r>
+          </a:p>
+          <a:p>
+            <a:r>
+              <a:rPr lang="en-US" sz="1600" u="sng" dirty="0"/>
+              <a:t>List of data sets or APIs used or created by the solution</a:t>
+            </a:r>
+            <a:r>
+              <a:rPr lang="en-US" sz="1600" dirty="0"/>
+              <a:t>: </a:t>
+            </a:r>
+          </a:p>
+          <a:p>
             <a:r>
               <a:rPr lang="en-US" sz="1600" dirty="0">
                 <a:hlinkClick r:id="rId2"/>
               </a:rPr>
-              <a:t>://</a:t>
-            </a:r>
-            <a:r>
-              <a:rPr lang="en-US" sz="1600" dirty="0" smtClean="0">
-                <a:hlinkClick r:id="rId2"/>
-              </a:rPr>
-              <a:t>www.in.gov/dlgf/8379.htm#Local</a:t>
-            </a:r>
-            <a:endParaRPr lang="en-US" sz="1600" dirty="0" smtClean="0"/>
+              <a:t>http://www.in.gov/dlgf/8379.htm#Local</a:t>
+            </a:r>
+            <a:endParaRPr lang="en-US" sz="1600" dirty="0"/>
           </a:p>
           <a:p>
             <a:r>
               <a:rPr lang="en-US" sz="1600" dirty="0">
                 <a:hlinkClick r:id="rId3"/>
               </a:rPr>
-              <a:t>http://</a:t>
-            </a:r>
-            <a:r>
-              <a:rPr lang="en-US" sz="1600" dirty="0" smtClean="0">
-                <a:hlinkClick r:id="rId3"/>
-              </a:rPr>
-              <a:t>www.countyhealthrankings.org/app/indiana/2017/downloads</a:t>
-            </a:r>
-            <a:endParaRPr lang="en-US" sz="1600" dirty="0" smtClean="0"/>
-          </a:p>
-          <a:p>
-            <a:r>
-              <a:rPr lang="en-US" sz="1600" u="sng" dirty="0" smtClean="0"/>
-              <a:t>Link </a:t>
-            </a:r>
-            <a:r>
-              <a:rPr lang="en-US" sz="1600" u="sng" dirty="0" smtClean="0"/>
-              <a:t>to download solution</a:t>
-            </a:r>
-            <a:r>
-              <a:rPr lang="en-US" sz="1600" dirty="0" smtClean="0"/>
+              <a:t>http://www.countyhealthrankings.org/app/indiana/2017/downloads</a:t>
+            </a:r>
+            <a:endParaRPr lang="en-US" sz="1600" dirty="0"/>
+          </a:p>
+          <a:p>
+            <a:r>
+              <a:rPr lang="en-US" sz="1600" u="sng" dirty="0"/>
+              <a:t>Link to download solution</a:t>
+            </a:r>
+            <a:r>
+              <a:rPr lang="en-US" sz="1600" dirty="0"/>
               <a:t>: </a:t>
             </a:r>
-            <a:endParaRPr lang="en-US" sz="1600" dirty="0" smtClean="0"/>
-          </a:p>
-          <a:p>
-            <a:r>
-              <a:rPr lang="en-US" sz="1600" dirty="0" smtClean="0">
-                <a:hlinkClick r:id="rId4"/>
-              </a:rPr>
-              <a:t>https</a:t>
-            </a:r>
+          </a:p>
+          <a:p>
             <a:r>
               <a:rPr lang="en-US" sz="1600" dirty="0">
                 <a:hlinkClick r:id="rId4"/>
               </a:rPr>
-              <a:t>://</a:t>
-            </a:r>
-            <a:r>
-              <a:rPr lang="en-US" sz="1600" dirty="0" smtClean="0">
-                <a:hlinkClick r:id="rId4"/>
-              </a:rPr>
-              <a:t>github.com/crowelmk/indy-civic-hack-17</a:t>
-            </a:r>
-            <a:endParaRPr lang="en-US" sz="1600" dirty="0" smtClean="0"/>
+              <a:t>https://github.com/crowelmk/indy-civic-hack-17</a:t>
+            </a:r>
+            <a:endParaRPr lang="en-US" sz="1600" dirty="0"/>
           </a:p>
         </p:txBody>
       </p:sp>
@@ -3805,13 +3704,6 @@
   <p:clrMapOvr>
     <a:masterClrMapping/>
   </p:clrMapOvr>
-  <p:timing>
-    <p:tnLst>
-      <p:par>
-        <p:cTn id="1" dur="indefinite" restart="never" nodeType="tmRoot"/>
-      </p:par>
-    </p:tnLst>
-  </p:timing>
 </p:sld>
 </file>
 

</xml_diff>